<commit_message>
After code-based migrations have been activated
</commit_message>
<xml_diff>
--- a/ppt/Entity Framework Migrations.pptx
+++ b/ppt/Entity Framework Migrations.pptx
@@ -110,6 +110,11 @@
       </a:defRPr>
     </a:lvl9pPr>
   </p:defaultTextStyle>
+  <p:extLst>
+    <p:ext uri="{EFAFB233-063F-42B5-8137-9DF3F51BA10A}">
+      <p15:sldGuideLst xmlns:p15="http://schemas.microsoft.com/office/powerpoint/2012/main"/>
+    </p:ext>
+  </p:extLst>
 </p:presentation>
 </file>
 
@@ -859,7 +864,7 @@
             <a:fld id="{B61BEF0D-F0BB-DE4B-95CE-6DB70DBA9567}" type="datetimeFigureOut">
               <a:rPr lang="en-US" dirty="0"/>
               <a:pPr/>
-              <a:t>11/5/2015</a:t>
+              <a:t>11/6/2015</a:t>
             </a:fld>
             <a:endParaRPr lang="en-US" dirty="0"/>
           </a:p>
@@ -1107,7 +1112,7 @@
             <a:fld id="{B61BEF0D-F0BB-DE4B-95CE-6DB70DBA9567}" type="datetimeFigureOut">
               <a:rPr lang="en-US" dirty="0"/>
               <a:pPr/>
-              <a:t>11/5/2015</a:t>
+              <a:t>11/6/2015</a:t>
             </a:fld>
             <a:endParaRPr lang="en-US" dirty="0"/>
           </a:p>
@@ -1418,7 +1423,7 @@
             <a:fld id="{B61BEF0D-F0BB-DE4B-95CE-6DB70DBA9567}" type="datetimeFigureOut">
               <a:rPr lang="en-US" dirty="0"/>
               <a:pPr/>
-              <a:t>11/5/2015</a:t>
+              <a:t>11/6/2015</a:t>
             </a:fld>
             <a:endParaRPr lang="en-US" dirty="0"/>
           </a:p>
@@ -1748,7 +1753,7 @@
             <a:fld id="{B61BEF0D-F0BB-DE4B-95CE-6DB70DBA9567}" type="datetimeFigureOut">
               <a:rPr lang="en-US" dirty="0"/>
               <a:pPr/>
-              <a:t>11/5/2015</a:t>
+              <a:t>11/6/2015</a:t>
             </a:fld>
             <a:endParaRPr lang="en-US" dirty="0"/>
           </a:p>
@@ -2059,7 +2064,7 @@
             <a:fld id="{B61BEF0D-F0BB-DE4B-95CE-6DB70DBA9567}" type="datetimeFigureOut">
               <a:rPr lang="en-US" dirty="0"/>
               <a:pPr/>
-              <a:t>11/5/2015</a:t>
+              <a:t>11/6/2015</a:t>
             </a:fld>
             <a:endParaRPr lang="en-US" dirty="0"/>
           </a:p>
@@ -2449,7 +2454,7 @@
             <a:fld id="{B61BEF0D-F0BB-DE4B-95CE-6DB70DBA9567}" type="datetimeFigureOut">
               <a:rPr lang="en-US" dirty="0"/>
               <a:pPr/>
-              <a:t>11/5/2015</a:t>
+              <a:t>11/6/2015</a:t>
             </a:fld>
             <a:endParaRPr lang="en-US" dirty="0"/>
           </a:p>
@@ -2615,7 +2620,7 @@
           <a:p>
             <a:fld id="{55C6B4A9-1611-4792-9094-5F34BCA07E0B}" type="datetimeFigureOut">
               <a:rPr lang="en-US" dirty="0"/>
-              <a:t>11/5/2015</a:t>
+              <a:t>11/6/2015</a:t>
             </a:fld>
             <a:endParaRPr lang="en-US" dirty="0"/>
           </a:p>
@@ -2791,7 +2796,7 @@
             <a:fld id="{B61BEF0D-F0BB-DE4B-95CE-6DB70DBA9567}" type="datetimeFigureOut">
               <a:rPr lang="en-US" dirty="0"/>
               <a:pPr/>
-              <a:t>11/5/2015</a:t>
+              <a:t>11/6/2015</a:t>
             </a:fld>
             <a:endParaRPr lang="en-US" dirty="0"/>
           </a:p>
@@ -2957,7 +2962,7 @@
           <a:p>
             <a:fld id="{42A54C80-263E-416B-A8E0-580EDEADCBDC}" type="datetimeFigureOut">
               <a:rPr lang="en-US" dirty="0"/>
-              <a:t>11/5/2015</a:t>
+              <a:t>11/6/2015</a:t>
             </a:fld>
             <a:endParaRPr lang="en-US" dirty="0"/>
           </a:p>
@@ -3200,7 +3205,7 @@
             <a:fld id="{B61BEF0D-F0BB-DE4B-95CE-6DB70DBA9567}" type="datetimeFigureOut">
               <a:rPr lang="en-US" dirty="0"/>
               <a:pPr/>
-              <a:t>11/5/2015</a:t>
+              <a:t>11/6/2015</a:t>
             </a:fld>
             <a:endParaRPr lang="en-US" dirty="0"/>
           </a:p>
@@ -3428,7 +3433,7 @@
           <a:p>
             <a:fld id="{42A54C80-263E-416B-A8E0-580EDEADCBDC}" type="datetimeFigureOut">
               <a:rPr lang="en-US" dirty="0"/>
-              <a:t>11/5/2015</a:t>
+              <a:t>11/6/2015</a:t>
             </a:fld>
             <a:endParaRPr lang="en-US" dirty="0"/>
           </a:p>
@@ -3798,7 +3803,7 @@
             <a:fld id="{B61BEF0D-F0BB-DE4B-95CE-6DB70DBA9567}" type="datetimeFigureOut">
               <a:rPr lang="en-US" dirty="0"/>
               <a:pPr/>
-              <a:t>11/5/2015</a:t>
+              <a:t>11/6/2015</a:t>
             </a:fld>
             <a:endParaRPr lang="en-US" dirty="0"/>
           </a:p>
@@ -3918,7 +3923,7 @@
             <a:fld id="{B61BEF0D-F0BB-DE4B-95CE-6DB70DBA9567}" type="datetimeFigureOut">
               <a:rPr lang="en-US" dirty="0"/>
               <a:pPr/>
-              <a:t>11/5/2015</a:t>
+              <a:t>11/6/2015</a:t>
             </a:fld>
             <a:endParaRPr lang="en-US" dirty="0"/>
           </a:p>
@@ -4010,7 +4015,7 @@
             <a:fld id="{B61BEF0D-F0BB-DE4B-95CE-6DB70DBA9567}" type="datetimeFigureOut">
               <a:rPr lang="en-US" dirty="0"/>
               <a:pPr/>
-              <a:t>11/5/2015</a:t>
+              <a:t>11/6/2015</a:t>
             </a:fld>
             <a:endParaRPr lang="en-US" dirty="0"/>
           </a:p>
@@ -4261,7 +4266,7 @@
           <a:p>
             <a:fld id="{42A54C80-263E-416B-A8E0-580EDEADCBDC}" type="datetimeFigureOut">
               <a:rPr lang="en-US" dirty="0"/>
-              <a:t>11/5/2015</a:t>
+              <a:t>11/6/2015</a:t>
             </a:fld>
             <a:endParaRPr lang="en-US" dirty="0"/>
           </a:p>
@@ -4563,7 +4568,7 @@
             <a:fld id="{B61BEF0D-F0BB-DE4B-95CE-6DB70DBA9567}" type="datetimeFigureOut">
               <a:rPr lang="en-US" dirty="0"/>
               <a:pPr/>
-              <a:t>11/5/2015</a:t>
+              <a:t>11/6/2015</a:t>
             </a:fld>
             <a:endParaRPr lang="en-US" dirty="0"/>
           </a:p>
@@ -5261,7 +5266,7 @@
             <a:fld id="{B61BEF0D-F0BB-DE4B-95CE-6DB70DBA9567}" type="datetimeFigureOut">
               <a:rPr lang="en-US" dirty="0"/>
               <a:pPr/>
-              <a:t>11/5/2015</a:t>
+              <a:t>11/6/2015</a:t>
             </a:fld>
             <a:endParaRPr lang="en-US" dirty="0"/>
           </a:p>
@@ -6001,7 +6006,12 @@
             <p:ph type="title"/>
           </p:nvPr>
         </p:nvSpPr>
-        <p:spPr/>
+        <p:spPr>
+          <a:xfrm>
+            <a:off x="677334" y="609600"/>
+            <a:ext cx="8596668" cy="774357"/>
+          </a:xfrm>
+        </p:spPr>
         <p:txBody>
           <a:bodyPr/>
           <a:lstStyle/>
@@ -6032,10 +6042,15 @@
             <p:ph idx="1"/>
           </p:nvPr>
         </p:nvSpPr>
-        <p:spPr/>
+        <p:spPr>
+          <a:xfrm>
+            <a:off x="677334" y="1328565"/>
+            <a:ext cx="8596668" cy="5022808"/>
+          </a:xfrm>
+        </p:spPr>
         <p:txBody>
           <a:bodyPr>
-            <a:normAutofit lnSpcReduction="10000"/>
+            <a:normAutofit/>
           </a:bodyPr>
           <a:lstStyle/>
           <a:p>
@@ -6048,29 +6063,29 @@
           <a:p>
             <a:pPr lvl="1"/>
             <a:r>
-              <a:rPr lang="de-DE" b="1" dirty="0" smtClean="0"/>
+              <a:rPr lang="de-DE" sz="1200" b="1" dirty="0" smtClean="0"/>
               <a:t>Default</a:t>
             </a:r>
           </a:p>
           <a:p>
             <a:pPr lvl="1"/>
             <a:r>
-              <a:rPr lang="de-DE" dirty="0" smtClean="0"/>
+              <a:rPr lang="de-DE" sz="1200" dirty="0" smtClean="0"/>
               <a:t>Legt eine DB an, wenn keine existiert. </a:t>
             </a:r>
           </a:p>
           <a:p>
             <a:pPr lvl="1"/>
             <a:r>
-              <a:rPr lang="de-DE" dirty="0" smtClean="0"/>
+              <a:rPr lang="de-DE" sz="1200" dirty="0" smtClean="0"/>
               <a:t>Wirft eine </a:t>
             </a:r>
             <a:r>
-              <a:rPr lang="de-DE" dirty="0" err="1" smtClean="0"/>
+              <a:rPr lang="de-DE" sz="1200" dirty="0" err="1" smtClean="0"/>
               <a:t>Exception</a:t>
             </a:r>
             <a:r>
-              <a:rPr lang="de-DE" dirty="0" smtClean="0"/>
+              <a:rPr lang="de-DE" sz="1200" dirty="0" smtClean="0"/>
               <a:t> wenn das Model vom tatsächlichen DB Schema abweicht</a:t>
             </a:r>
           </a:p>
@@ -6084,11 +6099,11 @@
           <a:p>
             <a:pPr lvl="1"/>
             <a:r>
-              <a:rPr lang="de-DE" dirty="0" err="1" smtClean="0"/>
+              <a:rPr lang="de-DE" sz="1200" dirty="0" err="1" smtClean="0"/>
               <a:t>Dropped</a:t>
             </a:r>
             <a:r>
-              <a:rPr lang="de-DE" dirty="0" smtClean="0"/>
+              <a:rPr lang="de-DE" sz="1200" dirty="0" smtClean="0"/>
               <a:t> evtl. existente DB wenn sich das Model geändert hat und legt eine neue an</a:t>
             </a:r>
           </a:p>
@@ -6102,15 +6117,15 @@
           <a:p>
             <a:pPr lvl="1"/>
             <a:r>
-              <a:rPr lang="de-DE" dirty="0" err="1" smtClean="0"/>
+              <a:rPr lang="de-DE" sz="1200" dirty="0" err="1" smtClean="0"/>
               <a:t>Dropped</a:t>
             </a:r>
             <a:r>
-              <a:rPr lang="de-DE" dirty="0"/>
+              <a:rPr lang="de-DE" sz="1200" dirty="0"/>
               <a:t> </a:t>
             </a:r>
             <a:r>
-              <a:rPr lang="de-DE" dirty="0" smtClean="0"/>
+              <a:rPr lang="de-DE" sz="1200" dirty="0" smtClean="0"/>
               <a:t>die DB immer und legt eine neue an</a:t>
             </a:r>
           </a:p>
@@ -6123,23 +6138,70 @@
               <a:rPr lang="de-DE" b="1" dirty="0" err="1" smtClean="0"/>
               <a:t>Initializer</a:t>
             </a:r>
-            <a:endParaRPr lang="de-DE" b="1" dirty="0" smtClean="0"/>
+            <a:endParaRPr lang="de-DE" sz="1200" b="1" dirty="0" smtClean="0"/>
           </a:p>
           <a:p>
             <a:pPr lvl="1"/>
             <a:r>
-              <a:rPr lang="de-DE" dirty="0" smtClean="0"/>
+              <a:rPr lang="de-DE" sz="1200" dirty="0" smtClean="0"/>
               <a:t>Man kann sich auch seinen eigenen </a:t>
             </a:r>
             <a:r>
-              <a:rPr lang="de-DE" dirty="0" err="1" smtClean="0"/>
+              <a:rPr lang="de-DE" sz="1200" dirty="0" err="1" smtClean="0"/>
               <a:t>Initializer</a:t>
             </a:r>
             <a:r>
-              <a:rPr lang="de-DE" dirty="0" smtClean="0"/>
+              <a:rPr lang="de-DE" sz="1200" dirty="0" smtClean="0"/>
               <a:t> schreiben</a:t>
             </a:r>
-            <a:endParaRPr lang="de-DE" dirty="0"/>
+          </a:p>
+          <a:p>
+            <a:r>
+              <a:rPr lang="de-DE" sz="1600" b="1" dirty="0" err="1" smtClean="0"/>
+              <a:t>MigrateDatabaseToLatestVersion</a:t>
+            </a:r>
+            <a:endParaRPr lang="de-DE" sz="1600" dirty="0" smtClean="0"/>
+          </a:p>
+          <a:p>
+            <a:pPr lvl="1"/>
+            <a:r>
+              <a:rPr lang="de-DE" sz="1200" dirty="0" smtClean="0"/>
+              <a:t>Migriert die Datenbank immer auf das neuste Model. (</a:t>
+            </a:r>
+            <a:r>
+              <a:rPr lang="de-DE" sz="1200" dirty="0" err="1" smtClean="0"/>
+              <a:t>Automatic</a:t>
+            </a:r>
+            <a:r>
+              <a:rPr lang="de-DE" sz="1200" dirty="0" smtClean="0"/>
+              <a:t> Migration)</a:t>
+            </a:r>
+          </a:p>
+          <a:p>
+            <a:r>
+              <a:rPr lang="de-DE" b="1" dirty="0" smtClean="0"/>
+              <a:t>Initialisierung abschalten</a:t>
+            </a:r>
+            <a:endParaRPr lang="de-DE" sz="1200" b="1" dirty="0" smtClean="0"/>
+          </a:p>
+          <a:p>
+            <a:pPr lvl="1"/>
+            <a:r>
+              <a:rPr lang="de-DE" sz="1200" dirty="0" err="1" smtClean="0"/>
+              <a:t>Database.SetInitializer</a:t>
+            </a:r>
+            <a:r>
+              <a:rPr lang="de-DE" sz="1200" dirty="0" smtClean="0"/>
+              <a:t>&lt;</a:t>
+            </a:r>
+            <a:r>
+              <a:rPr lang="de-DE" sz="1200" dirty="0" err="1" smtClean="0"/>
+              <a:t>YourContext</a:t>
+            </a:r>
+            <a:r>
+              <a:rPr lang="de-DE" sz="1200" dirty="0" smtClean="0"/>
+              <a:t>&gt;(null);</a:t>
+            </a:r>
           </a:p>
         </p:txBody>
       </p:sp>
@@ -6227,7 +6289,64 @@
           <a:bodyPr/>
           <a:lstStyle/>
           <a:p>
-            <a:endParaRPr lang="de-DE"/>
+            <a:r>
+              <a:rPr lang="de-DE" dirty="0" smtClean="0"/>
+              <a:t>Code First</a:t>
+            </a:r>
+          </a:p>
+          <a:p>
+            <a:pPr lvl="1"/>
+            <a:r>
+              <a:rPr lang="de-DE" dirty="0" smtClean="0"/>
+              <a:t>Domain </a:t>
+            </a:r>
+            <a:r>
+              <a:rPr lang="de-DE" dirty="0" err="1" smtClean="0"/>
+              <a:t>centric</a:t>
+            </a:r>
+            <a:r>
+              <a:rPr lang="de-DE" dirty="0" smtClean="0"/>
+              <a:t> (DDD) </a:t>
+            </a:r>
+            <a:r>
+              <a:rPr lang="de-DE" dirty="0" err="1" smtClean="0"/>
+              <a:t>approach</a:t>
+            </a:r>
+            <a:endParaRPr lang="de-DE" dirty="0" smtClean="0"/>
+          </a:p>
+          <a:p>
+            <a:pPr lvl="1"/>
+            <a:r>
+              <a:rPr lang="de-DE" dirty="0" smtClean="0"/>
+              <a:t>Domänenklassen zuerst, dann die Datenbank</a:t>
+            </a:r>
+          </a:p>
+          <a:p>
+            <a:r>
+              <a:rPr lang="de-DE" dirty="0" smtClean="0"/>
+              <a:t>Model First</a:t>
+            </a:r>
+          </a:p>
+          <a:p>
+            <a:pPr lvl="1"/>
+            <a:r>
+              <a:rPr lang="de-DE" dirty="0" smtClean="0"/>
+              <a:t>Entitäten, Beziehungen und Vererbung mittels EDMX Designer</a:t>
+            </a:r>
+            <a:endParaRPr lang="de-DE" dirty="0"/>
+          </a:p>
+          <a:p>
+            <a:r>
+              <a:rPr lang="de-DE" dirty="0" smtClean="0"/>
+              <a:t>Database First</a:t>
+            </a:r>
+          </a:p>
+          <a:p>
+            <a:pPr lvl="1"/>
+            <a:r>
+              <a:rPr lang="de-DE" dirty="0" smtClean="0"/>
+              <a:t>Wenn es schon eine Datenbank gibt</a:t>
+            </a:r>
           </a:p>
         </p:txBody>
       </p:sp>
@@ -6307,7 +6426,104 @@
           <a:bodyPr/>
           <a:lstStyle/>
           <a:p>
-            <a:endParaRPr lang="de-DE"/>
+            <a:r>
+              <a:rPr lang="de-DE" dirty="0" smtClean="0"/>
+              <a:t>Wird per „</a:t>
+            </a:r>
+            <a:r>
+              <a:rPr lang="de-DE" dirty="0" err="1" smtClean="0"/>
+              <a:t>package</a:t>
+            </a:r>
+            <a:r>
+              <a:rPr lang="de-DE" dirty="0" smtClean="0"/>
+              <a:t> </a:t>
+            </a:r>
+            <a:r>
+              <a:rPr lang="de-DE" dirty="0" err="1" smtClean="0"/>
+              <a:t>manager</a:t>
+            </a:r>
+            <a:r>
+              <a:rPr lang="de-DE" dirty="0" smtClean="0"/>
+              <a:t> </a:t>
+            </a:r>
+            <a:r>
+              <a:rPr lang="de-DE" dirty="0" err="1" smtClean="0"/>
+              <a:t>console</a:t>
+            </a:r>
+            <a:r>
+              <a:rPr lang="de-DE" dirty="0" smtClean="0"/>
+              <a:t>“ aktiviert (einmalig)</a:t>
+            </a:r>
+          </a:p>
+          <a:p>
+            <a:r>
+              <a:rPr lang="de-DE" dirty="0" smtClean="0"/>
+              <a:t>Erzeugt ein </a:t>
+            </a:r>
+            <a:r>
+              <a:rPr lang="de-DE" dirty="0" err="1" smtClean="0"/>
+              <a:t>config</a:t>
+            </a:r>
+            <a:r>
+              <a:rPr lang="de-DE" dirty="0" smtClean="0"/>
+              <a:t>-file (mit </a:t>
+            </a:r>
+            <a:r>
+              <a:rPr lang="de-DE" dirty="0" err="1" smtClean="0"/>
+              <a:t>AutomaticMigrationsEnabled</a:t>
+            </a:r>
+            <a:r>
+              <a:rPr lang="de-DE" dirty="0" smtClean="0"/>
+              <a:t> = </a:t>
+            </a:r>
+            <a:r>
+              <a:rPr lang="de-DE" dirty="0" err="1" smtClean="0"/>
+              <a:t>true</a:t>
+            </a:r>
+            <a:r>
+              <a:rPr lang="de-DE" dirty="0" smtClean="0"/>
+              <a:t>)</a:t>
+            </a:r>
+            <a:endParaRPr lang="de-DE" dirty="0" smtClean="0"/>
+          </a:p>
+          <a:p>
+            <a:r>
+              <a:rPr lang="de-DE" dirty="0" smtClean="0"/>
+              <a:t>Migriert die Datenbank automatisch auf den neusten Stand wenn sich das Model geändert hat</a:t>
+            </a:r>
+          </a:p>
+          <a:p>
+            <a:r>
+              <a:rPr lang="de-DE" dirty="0" smtClean="0"/>
+              <a:t>! Entfernen von z.B. Feldern führt zu „</a:t>
+            </a:r>
+            <a:r>
+              <a:rPr lang="de-DE" dirty="0" err="1" smtClean="0"/>
+              <a:t>AutomaticDataLossExceptions</a:t>
+            </a:r>
+            <a:r>
+              <a:rPr lang="de-DE" dirty="0" smtClean="0"/>
+              <a:t>“</a:t>
+            </a:r>
+          </a:p>
+          <a:p>
+            <a:r>
+              <a:rPr lang="de-DE" dirty="0" err="1" smtClean="0"/>
+              <a:t>AutomaticDataLossExceptions</a:t>
+            </a:r>
+            <a:r>
+              <a:rPr lang="de-DE" dirty="0" smtClean="0"/>
+              <a:t> können per </a:t>
+            </a:r>
+            <a:r>
+              <a:rPr lang="de-DE" dirty="0" err="1" smtClean="0"/>
+              <a:t>config</a:t>
+            </a:r>
+            <a:r>
+              <a:rPr lang="de-DE" dirty="0" smtClean="0"/>
+              <a:t>-file behandelt werden</a:t>
+            </a:r>
+            <a:endParaRPr lang="de-DE" dirty="0"/>
           </a:p>
         </p:txBody>
       </p:sp>
@@ -6358,7 +6574,15 @@
           <a:p>
             <a:r>
               <a:rPr lang="de-DE" dirty="0" smtClean="0"/>
-              <a:t>Code First </a:t>
+              <a:t>Code </a:t>
+            </a:r>
+            <a:r>
+              <a:rPr lang="de-DE" dirty="0" err="1" smtClean="0"/>
+              <a:t>Based</a:t>
+            </a:r>
+            <a:r>
+              <a:rPr lang="de-DE" dirty="0"/>
+              <a:t> </a:t>
             </a:r>
             <a:r>
               <a:rPr lang="de-DE" dirty="0" err="1" smtClean="0"/>
@@ -6383,7 +6607,60 @@
           <a:bodyPr/>
           <a:lstStyle/>
           <a:p>
-            <a:endParaRPr lang="de-DE"/>
+            <a:r>
+              <a:rPr lang="de-DE" dirty="0" smtClean="0"/>
+              <a:t>Aktivierung per </a:t>
+            </a:r>
+            <a:r>
+              <a:rPr lang="de-DE" b="1" dirty="0" err="1" smtClean="0">
+                <a:latin typeface="Consolas" panose="020B0609020204030204" pitchFamily="49" charset="0"/>
+                <a:cs typeface="Consolas" panose="020B0609020204030204" pitchFamily="49" charset="0"/>
+              </a:rPr>
+              <a:t>enable-migrations</a:t>
+            </a:r>
+            <a:r>
+              <a:rPr lang="de-DE" dirty="0" smtClean="0"/>
+              <a:t> </a:t>
+            </a:r>
+            <a:r>
+              <a:rPr lang="de-DE" dirty="0" smtClean="0"/>
+              <a:t>in der </a:t>
+            </a:r>
+            <a:r>
+              <a:rPr lang="de-DE" dirty="0" smtClean="0"/>
+              <a:t>„</a:t>
+            </a:r>
+            <a:r>
+              <a:rPr lang="de-DE" dirty="0" err="1" smtClean="0"/>
+              <a:t>package</a:t>
+            </a:r>
+            <a:r>
+              <a:rPr lang="de-DE" dirty="0" smtClean="0"/>
+              <a:t> </a:t>
+            </a:r>
+            <a:r>
+              <a:rPr lang="de-DE" dirty="0" err="1" smtClean="0"/>
+              <a:t>manager</a:t>
+            </a:r>
+            <a:r>
+              <a:rPr lang="de-DE" dirty="0" smtClean="0"/>
+              <a:t> </a:t>
+            </a:r>
+            <a:r>
+              <a:rPr lang="de-DE" dirty="0" err="1" smtClean="0"/>
+              <a:t>console</a:t>
+            </a:r>
+            <a:r>
+              <a:rPr lang="de-DE" dirty="0" smtClean="0"/>
+              <a:t>“ </a:t>
+            </a:r>
+          </a:p>
+          <a:p>
+            <a:r>
+              <a:rPr lang="de-DE" dirty="0" smtClean="0"/>
+              <a:t> </a:t>
+            </a:r>
+            <a:endParaRPr lang="de-DE" dirty="0"/>
           </a:p>
         </p:txBody>
       </p:sp>

</xml_diff>